<commit_message>
Add committee meeting 2022-11-01 presentation notebook
</commit_message>
<xml_diff>
--- a/genericPPT.pptx
+++ b/genericPPT.pptx
@@ -256,7 +256,7 @@
           <a:p>
             <a:fld id="{33C097DD-9DB6-4F84-85E9-154C10E390F0}" type="datetimeFigureOut">
               <a:rPr lang="en-US" smtClean="0"/>
-              <a:t>10/16/2022</a:t>
+              <a:t>10/25/2022</a:t>
             </a:fld>
             <a:endParaRPr lang="en-US"/>
           </a:p>
@@ -330,6 +330,147 @@
 </file>
 
 <file path=ppt/slideLayouts/slideLayout10.xml><?xml version="1.0" encoding="utf-8"?>
+<p:sldLayout xmlns:a="http://schemas.openxmlformats.org/drawingml/2006/main" xmlns:r="http://schemas.openxmlformats.org/officeDocument/2006/relationships" xmlns:p="http://schemas.openxmlformats.org/presentationml/2006/main" type="titleOnly" preserve="1">
+  <p:cSld name="Title Only">
+    <p:spTree>
+      <p:nvGrpSpPr>
+        <p:cNvPr id="1" name=""/>
+        <p:cNvGrpSpPr/>
+        <p:nvPr/>
+      </p:nvGrpSpPr>
+      <p:grpSpPr>
+        <a:xfrm>
+          <a:off x="0" y="0"/>
+          <a:ext cx="0" cy="0"/>
+          <a:chOff x="0" y="0"/>
+          <a:chExt cx="0" cy="0"/>
+        </a:xfrm>
+      </p:grpSpPr>
+      <p:sp>
+        <p:nvSpPr>
+          <p:cNvPr id="2" name="Title 1">
+            <a:extLst>
+              <a:ext uri="{FF2B5EF4-FFF2-40B4-BE49-F238E27FC236}">
+                <a16:creationId xmlns:a16="http://schemas.microsoft.com/office/drawing/2014/main" id="{5A4F245B-1D17-452E-A2AA-89328C26855D}"/>
+              </a:ext>
+            </a:extLst>
+          </p:cNvPr>
+          <p:cNvSpPr>
+            <a:spLocks noGrp="1"/>
+          </p:cNvSpPr>
+          <p:nvPr>
+            <p:ph type="title"/>
+          </p:nvPr>
+        </p:nvSpPr>
+        <p:spPr/>
+        <p:txBody>
+          <a:bodyPr/>
+          <a:lstStyle/>
+          <a:p>
+            <a:r>
+              <a:rPr lang="en-US"/>
+              <a:t>Click to edit Master title style</a:t>
+            </a:r>
+          </a:p>
+        </p:txBody>
+      </p:sp>
+      <p:sp>
+        <p:nvSpPr>
+          <p:cNvPr id="3" name="Date Placeholder 2">
+            <a:extLst>
+              <a:ext uri="{FF2B5EF4-FFF2-40B4-BE49-F238E27FC236}">
+                <a16:creationId xmlns:a16="http://schemas.microsoft.com/office/drawing/2014/main" id="{55069989-CAE6-4EC9-8C6A-0C2BA50223ED}"/>
+              </a:ext>
+            </a:extLst>
+          </p:cNvPr>
+          <p:cNvSpPr>
+            <a:spLocks noGrp="1"/>
+          </p:cNvSpPr>
+          <p:nvPr>
+            <p:ph type="dt" sz="half" idx="10"/>
+          </p:nvPr>
+        </p:nvSpPr>
+        <p:spPr/>
+        <p:txBody>
+          <a:bodyPr/>
+          <a:lstStyle/>
+          <a:p>
+            <a:fld id="{33C097DD-9DB6-4F84-85E9-154C10E390F0}" type="datetimeFigureOut">
+              <a:rPr lang="en-US" smtClean="0"/>
+              <a:t>10/25/2022</a:t>
+            </a:fld>
+            <a:endParaRPr lang="en-US"/>
+          </a:p>
+        </p:txBody>
+      </p:sp>
+      <p:sp>
+        <p:nvSpPr>
+          <p:cNvPr id="4" name="Footer Placeholder 3">
+            <a:extLst>
+              <a:ext uri="{FF2B5EF4-FFF2-40B4-BE49-F238E27FC236}">
+                <a16:creationId xmlns:a16="http://schemas.microsoft.com/office/drawing/2014/main" id="{D3FADBF3-6DCF-4B88-87F6-F4028E65D706}"/>
+              </a:ext>
+            </a:extLst>
+          </p:cNvPr>
+          <p:cNvSpPr>
+            <a:spLocks noGrp="1"/>
+          </p:cNvSpPr>
+          <p:nvPr>
+            <p:ph type="ftr" sz="quarter" idx="11"/>
+          </p:nvPr>
+        </p:nvSpPr>
+        <p:spPr/>
+        <p:txBody>
+          <a:bodyPr/>
+          <a:lstStyle/>
+          <a:p>
+            <a:endParaRPr lang="en-US"/>
+          </a:p>
+        </p:txBody>
+      </p:sp>
+      <p:sp>
+        <p:nvSpPr>
+          <p:cNvPr id="5" name="Slide Number Placeholder 4">
+            <a:extLst>
+              <a:ext uri="{FF2B5EF4-FFF2-40B4-BE49-F238E27FC236}">
+                <a16:creationId xmlns:a16="http://schemas.microsoft.com/office/drawing/2014/main" id="{F6B2BFF5-BA85-4196-BF70-3F8232BEFD23}"/>
+              </a:ext>
+            </a:extLst>
+          </p:cNvPr>
+          <p:cNvSpPr>
+            <a:spLocks noGrp="1"/>
+          </p:cNvSpPr>
+          <p:nvPr>
+            <p:ph type="sldNum" sz="quarter" idx="12"/>
+          </p:nvPr>
+        </p:nvSpPr>
+        <p:spPr/>
+        <p:txBody>
+          <a:bodyPr/>
+          <a:lstStyle/>
+          <a:p>
+            <a:fld id="{6CBBE739-9242-47BC-BB2E-5DA11B8BDC80}" type="slidenum">
+              <a:rPr lang="en-US" smtClean="0"/>
+              <a:t>‹#›</a:t>
+            </a:fld>
+            <a:endParaRPr lang="en-US"/>
+          </a:p>
+        </p:txBody>
+      </p:sp>
+    </p:spTree>
+    <p:extLst>
+      <p:ext uri="{BB962C8B-B14F-4D97-AF65-F5344CB8AC3E}">
+        <p14:creationId xmlns:p14="http://schemas.microsoft.com/office/powerpoint/2010/main" val="4069448343"/>
+      </p:ext>
+    </p:extLst>
+  </p:cSld>
+  <p:clrMapOvr>
+    <a:masterClrMapping/>
+  </p:clrMapOvr>
+</p:sldLayout>
+</file>
+
+<file path=ppt/slideLayouts/slideLayout11.xml><?xml version="1.0" encoding="utf-8"?>
 <p:sldLayout xmlns:a="http://schemas.openxmlformats.org/drawingml/2006/main" xmlns:r="http://schemas.openxmlformats.org/officeDocument/2006/relationships" xmlns:p="http://schemas.openxmlformats.org/presentationml/2006/main" type="blank" preserve="1">
   <p:cSld name="Blank">
     <p:spTree>
@@ -369,7 +510,7 @@
           <a:p>
             <a:fld id="{33C097DD-9DB6-4F84-85E9-154C10E390F0}" type="datetimeFigureOut">
               <a:rPr lang="en-US" smtClean="0"/>
-              <a:t>10/16/2022</a:t>
+              <a:t>10/25/2022</a:t>
             </a:fld>
             <a:endParaRPr lang="en-US"/>
           </a:p>
@@ -442,7 +583,7 @@
 </p:sldLayout>
 </file>
 
-<file path=ppt/slideLayouts/slideLayout11.xml><?xml version="1.0" encoding="utf-8"?>
+<file path=ppt/slideLayouts/slideLayout12.xml><?xml version="1.0" encoding="utf-8"?>
 <p:sldLayout xmlns:a="http://schemas.openxmlformats.org/drawingml/2006/main" xmlns:r="http://schemas.openxmlformats.org/officeDocument/2006/relationships" xmlns:p="http://schemas.openxmlformats.org/presentationml/2006/main" type="objTx" preserve="1">
   <p:cSld name="Content with Caption">
     <p:spTree>
@@ -680,7 +821,7 @@
           <a:p>
             <a:fld id="{33C097DD-9DB6-4F84-85E9-154C10E390F0}" type="datetimeFigureOut">
               <a:rPr lang="en-US" smtClean="0"/>
-              <a:t>10/16/2022</a:t>
+              <a:t>10/25/2022</a:t>
             </a:fld>
             <a:endParaRPr lang="en-US"/>
           </a:p>
@@ -753,7 +894,7 @@
 </p:sldLayout>
 </file>
 
-<file path=ppt/slideLayouts/slideLayout12.xml><?xml version="1.0" encoding="utf-8"?>
+<file path=ppt/slideLayouts/slideLayout13.xml><?xml version="1.0" encoding="utf-8"?>
 <p:sldLayout xmlns:a="http://schemas.openxmlformats.org/drawingml/2006/main" xmlns:r="http://schemas.openxmlformats.org/officeDocument/2006/relationships" xmlns:p="http://schemas.openxmlformats.org/presentationml/2006/main" type="picTx" preserve="1">
   <p:cSld name="Picture with Caption">
     <p:spTree>
@@ -968,7 +1109,7 @@
           <a:p>
             <a:fld id="{33C097DD-9DB6-4F84-85E9-154C10E390F0}" type="datetimeFigureOut">
               <a:rPr lang="en-US" smtClean="0"/>
-              <a:t>10/16/2022</a:t>
+              <a:t>10/25/2022</a:t>
             </a:fld>
             <a:endParaRPr lang="en-US"/>
           </a:p>
@@ -1041,7 +1182,7 @@
 </p:sldLayout>
 </file>
 
-<file path=ppt/slideLayouts/slideLayout13.xml><?xml version="1.0" encoding="utf-8"?>
+<file path=ppt/slideLayouts/slideLayout14.xml><?xml version="1.0" encoding="utf-8"?>
 <p:sldLayout xmlns:a="http://schemas.openxmlformats.org/drawingml/2006/main" xmlns:r="http://schemas.openxmlformats.org/officeDocument/2006/relationships" xmlns:p="http://schemas.openxmlformats.org/presentationml/2006/main" type="vertTx" preserve="1">
   <p:cSld name="Title and Vertical Text">
     <p:spTree>
@@ -1166,7 +1307,7 @@
           <a:p>
             <a:fld id="{33C097DD-9DB6-4F84-85E9-154C10E390F0}" type="datetimeFigureOut">
               <a:rPr lang="en-US" smtClean="0"/>
-              <a:t>10/16/2022</a:t>
+              <a:t>10/25/2022</a:t>
             </a:fld>
             <a:endParaRPr lang="en-US"/>
           </a:p>
@@ -1239,7 +1380,7 @@
 </p:sldLayout>
 </file>
 
-<file path=ppt/slideLayouts/slideLayout14.xml><?xml version="1.0" encoding="utf-8"?>
+<file path=ppt/slideLayouts/slideLayout15.xml><?xml version="1.0" encoding="utf-8"?>
 <p:sldLayout xmlns:a="http://schemas.openxmlformats.org/drawingml/2006/main" xmlns:r="http://schemas.openxmlformats.org/officeDocument/2006/relationships" xmlns:p="http://schemas.openxmlformats.org/presentationml/2006/main" type="vertTitleAndTx" preserve="1">
   <p:cSld name="Vertical Title and Text">
     <p:spTree>
@@ -1374,7 +1515,7 @@
           <a:p>
             <a:fld id="{33C097DD-9DB6-4F84-85E9-154C10E390F0}" type="datetimeFigureOut">
               <a:rPr lang="en-US" smtClean="0"/>
-              <a:t>10/16/2022</a:t>
+              <a:t>10/25/2022</a:t>
             </a:fld>
             <a:endParaRPr lang="en-US"/>
           </a:p>
@@ -1572,7 +1713,7 @@
           <a:p>
             <a:fld id="{33C097DD-9DB6-4F84-85E9-154C10E390F0}" type="datetimeFigureOut">
               <a:rPr lang="en-US" smtClean="0"/>
-              <a:t>10/16/2022</a:t>
+              <a:t>10/25/2022</a:t>
             </a:fld>
             <a:endParaRPr lang="en-US"/>
           </a:p>
@@ -1775,7 +1916,7 @@
           <a:p>
             <a:fld id="{33C097DD-9DB6-4F84-85E9-154C10E390F0}" type="datetimeFigureOut">
               <a:rPr lang="en-US" smtClean="0"/>
-              <a:t>10/16/2022</a:t>
+              <a:t>10/25/2022</a:t>
             </a:fld>
             <a:endParaRPr lang="en-US"/>
           </a:p>
@@ -2102,7 +2243,7 @@
           <a:p>
             <a:fld id="{33C097DD-9DB6-4F84-85E9-154C10E390F0}" type="datetimeFigureOut">
               <a:rPr lang="en-US" smtClean="0"/>
-              <a:t>10/16/2022</a:t>
+              <a:t>10/25/2022</a:t>
             </a:fld>
             <a:endParaRPr lang="en-US"/>
           </a:p>
@@ -2429,7 +2570,7 @@
           <a:p>
             <a:fld id="{33C097DD-9DB6-4F84-85E9-154C10E390F0}" type="datetimeFigureOut">
               <a:rPr lang="en-US" smtClean="0"/>
-              <a:t>10/16/2022</a:t>
+              <a:t>10/25/2022</a:t>
             </a:fld>
             <a:endParaRPr lang="en-US"/>
           </a:p>
@@ -3330,7 +3471,7 @@
           <a:p>
             <a:fld id="{33C097DD-9DB6-4F84-85E9-154C10E390F0}" type="datetimeFigureOut">
               <a:rPr lang="en-US" smtClean="0"/>
-              <a:t>10/16/2022</a:t>
+              <a:t>10/25/2022</a:t>
             </a:fld>
             <a:endParaRPr lang="en-US"/>
           </a:p>
@@ -3595,7 +3736,7 @@
           <a:p>
             <a:fld id="{33C097DD-9DB6-4F84-85E9-154C10E390F0}" type="datetimeFigureOut">
               <a:rPr lang="en-US" smtClean="0"/>
-              <a:t>10/16/2022</a:t>
+              <a:t>10/25/2022</a:t>
             </a:fld>
             <a:endParaRPr lang="en-US"/>
           </a:p>
@@ -3669,6 +3810,271 @@
 </file>
 
 <file path=ppt/slideLayouts/slideLayout8.xml><?xml version="1.0" encoding="utf-8"?>
+<p:sldLayout xmlns:a="http://schemas.openxmlformats.org/drawingml/2006/main" xmlns:r="http://schemas.openxmlformats.org/officeDocument/2006/relationships" xmlns:p="http://schemas.openxmlformats.org/presentationml/2006/main" type="twoObj" preserve="1">
+  <p:cSld name="Two content more left">
+    <p:spTree>
+      <p:nvGrpSpPr>
+        <p:cNvPr id="1" name=""/>
+        <p:cNvGrpSpPr/>
+        <p:nvPr/>
+      </p:nvGrpSpPr>
+      <p:grpSpPr>
+        <a:xfrm>
+          <a:off x="0" y="0"/>
+          <a:ext cx="0" cy="0"/>
+          <a:chOff x="0" y="0"/>
+          <a:chExt cx="0" cy="0"/>
+        </a:xfrm>
+      </p:grpSpPr>
+      <p:sp>
+        <p:nvSpPr>
+          <p:cNvPr id="2" name="Title 1">
+            <a:extLst>
+              <a:ext uri="{FF2B5EF4-FFF2-40B4-BE49-F238E27FC236}">
+                <a16:creationId xmlns:a16="http://schemas.microsoft.com/office/drawing/2014/main" id="{365AA7AC-1672-4871-A421-F2B0A241F4A1}"/>
+              </a:ext>
+            </a:extLst>
+          </p:cNvPr>
+          <p:cNvSpPr>
+            <a:spLocks noGrp="1"/>
+          </p:cNvSpPr>
+          <p:nvPr>
+            <p:ph type="title"/>
+          </p:nvPr>
+        </p:nvSpPr>
+        <p:spPr/>
+        <p:txBody>
+          <a:bodyPr/>
+          <a:lstStyle/>
+          <a:p>
+            <a:r>
+              <a:rPr lang="en-US"/>
+              <a:t>Click to edit Master title style</a:t>
+            </a:r>
+          </a:p>
+        </p:txBody>
+      </p:sp>
+      <p:sp>
+        <p:nvSpPr>
+          <p:cNvPr id="3" name="Content Placeholder 2">
+            <a:extLst>
+              <a:ext uri="{FF2B5EF4-FFF2-40B4-BE49-F238E27FC236}">
+                <a16:creationId xmlns:a16="http://schemas.microsoft.com/office/drawing/2014/main" id="{FF2AEC64-9473-4947-BC75-41DCBE2D988A}"/>
+              </a:ext>
+            </a:extLst>
+          </p:cNvPr>
+          <p:cNvSpPr>
+            <a:spLocks noGrp="1"/>
+          </p:cNvSpPr>
+          <p:nvPr>
+            <p:ph sz="half" idx="1"/>
+          </p:nvPr>
+        </p:nvSpPr>
+        <p:spPr>
+          <a:xfrm>
+            <a:off x="838200" y="1825625"/>
+            <a:ext cx="6912864" cy="4572000"/>
+          </a:xfrm>
+        </p:spPr>
+        <p:txBody>
+          <a:bodyPr/>
+          <a:lstStyle/>
+          <a:p>
+            <a:pPr lvl="0"/>
+            <a:r>
+              <a:rPr lang="en-US" dirty="0"/>
+              <a:t>Click to edit Master text styles</a:t>
+            </a:r>
+          </a:p>
+          <a:p>
+            <a:pPr lvl="1"/>
+            <a:r>
+              <a:rPr lang="en-US" dirty="0"/>
+              <a:t>Second level</a:t>
+            </a:r>
+          </a:p>
+          <a:p>
+            <a:pPr lvl="2"/>
+            <a:r>
+              <a:rPr lang="en-US" dirty="0"/>
+              <a:t>Third level</a:t>
+            </a:r>
+          </a:p>
+          <a:p>
+            <a:pPr lvl="3"/>
+            <a:r>
+              <a:rPr lang="en-US" dirty="0"/>
+              <a:t>Fourth level</a:t>
+            </a:r>
+          </a:p>
+          <a:p>
+            <a:pPr lvl="4"/>
+            <a:r>
+              <a:rPr lang="en-US" dirty="0"/>
+              <a:t>Fifth level</a:t>
+            </a:r>
+          </a:p>
+        </p:txBody>
+      </p:sp>
+      <p:sp>
+        <p:nvSpPr>
+          <p:cNvPr id="4" name="Content Placeholder 3">
+            <a:extLst>
+              <a:ext uri="{FF2B5EF4-FFF2-40B4-BE49-F238E27FC236}">
+                <a16:creationId xmlns:a16="http://schemas.microsoft.com/office/drawing/2014/main" id="{D5814B3D-9E95-487F-8B98-02AE7CF7F9B0}"/>
+              </a:ext>
+            </a:extLst>
+          </p:cNvPr>
+          <p:cNvSpPr>
+            <a:spLocks noGrp="1"/>
+          </p:cNvSpPr>
+          <p:nvPr>
+            <p:ph sz="half" idx="2"/>
+          </p:nvPr>
+        </p:nvSpPr>
+        <p:spPr>
+          <a:xfrm>
+            <a:off x="7897368" y="1825625"/>
+            <a:ext cx="3456432" cy="4572000"/>
+          </a:xfrm>
+        </p:spPr>
+        <p:txBody>
+          <a:bodyPr/>
+          <a:lstStyle/>
+          <a:p>
+            <a:pPr lvl="0"/>
+            <a:r>
+              <a:rPr lang="en-US" dirty="0"/>
+              <a:t>Click to edit Master text styles</a:t>
+            </a:r>
+          </a:p>
+          <a:p>
+            <a:pPr lvl="1"/>
+            <a:r>
+              <a:rPr lang="en-US" dirty="0"/>
+              <a:t>Second level</a:t>
+            </a:r>
+          </a:p>
+          <a:p>
+            <a:pPr lvl="2"/>
+            <a:r>
+              <a:rPr lang="en-US" dirty="0"/>
+              <a:t>Third level</a:t>
+            </a:r>
+          </a:p>
+          <a:p>
+            <a:pPr lvl="3"/>
+            <a:r>
+              <a:rPr lang="en-US" dirty="0"/>
+              <a:t>Fourth level</a:t>
+            </a:r>
+          </a:p>
+          <a:p>
+            <a:pPr lvl="4"/>
+            <a:r>
+              <a:rPr lang="en-US" dirty="0"/>
+              <a:t>Fifth level</a:t>
+            </a:r>
+          </a:p>
+        </p:txBody>
+      </p:sp>
+      <p:sp>
+        <p:nvSpPr>
+          <p:cNvPr id="5" name="Date Placeholder 4">
+            <a:extLst>
+              <a:ext uri="{FF2B5EF4-FFF2-40B4-BE49-F238E27FC236}">
+                <a16:creationId xmlns:a16="http://schemas.microsoft.com/office/drawing/2014/main" id="{391055C4-FB1B-4F58-A219-DE268A05A859}"/>
+              </a:ext>
+            </a:extLst>
+          </p:cNvPr>
+          <p:cNvSpPr>
+            <a:spLocks noGrp="1"/>
+          </p:cNvSpPr>
+          <p:nvPr>
+            <p:ph type="dt" sz="half" idx="10"/>
+          </p:nvPr>
+        </p:nvSpPr>
+        <p:spPr/>
+        <p:txBody>
+          <a:bodyPr/>
+          <a:lstStyle/>
+          <a:p>
+            <a:fld id="{33C097DD-9DB6-4F84-85E9-154C10E390F0}" type="datetimeFigureOut">
+              <a:rPr lang="en-US" smtClean="0"/>
+              <a:t>10/25/2022</a:t>
+            </a:fld>
+            <a:endParaRPr lang="en-US"/>
+          </a:p>
+        </p:txBody>
+      </p:sp>
+      <p:sp>
+        <p:nvSpPr>
+          <p:cNvPr id="6" name="Footer Placeholder 5">
+            <a:extLst>
+              <a:ext uri="{FF2B5EF4-FFF2-40B4-BE49-F238E27FC236}">
+                <a16:creationId xmlns:a16="http://schemas.microsoft.com/office/drawing/2014/main" id="{D9D61E95-C624-428D-BBC8-26AFD5671E32}"/>
+              </a:ext>
+            </a:extLst>
+          </p:cNvPr>
+          <p:cNvSpPr>
+            <a:spLocks noGrp="1"/>
+          </p:cNvSpPr>
+          <p:nvPr>
+            <p:ph type="ftr" sz="quarter" idx="11"/>
+          </p:nvPr>
+        </p:nvSpPr>
+        <p:spPr/>
+        <p:txBody>
+          <a:bodyPr/>
+          <a:lstStyle/>
+          <a:p>
+            <a:endParaRPr lang="en-US"/>
+          </a:p>
+        </p:txBody>
+      </p:sp>
+      <p:sp>
+        <p:nvSpPr>
+          <p:cNvPr id="7" name="Slide Number Placeholder 6">
+            <a:extLst>
+              <a:ext uri="{FF2B5EF4-FFF2-40B4-BE49-F238E27FC236}">
+                <a16:creationId xmlns:a16="http://schemas.microsoft.com/office/drawing/2014/main" id="{D0488A1F-2FA2-4FCF-A368-D01DF23E315B}"/>
+              </a:ext>
+            </a:extLst>
+          </p:cNvPr>
+          <p:cNvSpPr>
+            <a:spLocks noGrp="1"/>
+          </p:cNvSpPr>
+          <p:nvPr>
+            <p:ph type="sldNum" sz="quarter" idx="12"/>
+          </p:nvPr>
+        </p:nvSpPr>
+        <p:spPr/>
+        <p:txBody>
+          <a:bodyPr/>
+          <a:lstStyle/>
+          <a:p>
+            <a:fld id="{6CBBE739-9242-47BC-BB2E-5DA11B8BDC80}" type="slidenum">
+              <a:rPr lang="en-US" smtClean="0"/>
+              <a:t>‹#›</a:t>
+            </a:fld>
+            <a:endParaRPr lang="en-US"/>
+          </a:p>
+        </p:txBody>
+      </p:sp>
+    </p:spTree>
+    <p:extLst>
+      <p:ext uri="{BB962C8B-B14F-4D97-AF65-F5344CB8AC3E}">
+        <p14:creationId xmlns:p14="http://schemas.microsoft.com/office/powerpoint/2010/main" val="1254799339"/>
+      </p:ext>
+    </p:extLst>
+  </p:cSld>
+  <p:clrMapOvr>
+    <a:masterClrMapping/>
+  </p:clrMapOvr>
+</p:sldLayout>
+</file>
+
+<file path=ppt/slideLayouts/slideLayout9.xml><?xml version="1.0" encoding="utf-8"?>
 <p:sldLayout xmlns:a="http://schemas.openxmlformats.org/drawingml/2006/main" xmlns:r="http://schemas.openxmlformats.org/officeDocument/2006/relationships" xmlns:p="http://schemas.openxmlformats.org/presentationml/2006/main" type="twoTxTwoObj" preserve="1">
   <p:cSld name="Comparison">
     <p:spTree>
@@ -4007,7 +4413,7 @@
           <a:p>
             <a:fld id="{33C097DD-9DB6-4F84-85E9-154C10E390F0}" type="datetimeFigureOut">
               <a:rPr lang="en-US" smtClean="0"/>
-              <a:t>10/16/2022</a:t>
+              <a:t>10/25/2022</a:t>
             </a:fld>
             <a:endParaRPr lang="en-US"/>
           </a:p>
@@ -4071,147 +4477,6 @@
     <p:extLst>
       <p:ext uri="{BB962C8B-B14F-4D97-AF65-F5344CB8AC3E}">
         <p14:creationId xmlns:p14="http://schemas.microsoft.com/office/powerpoint/2010/main" val="2841098504"/>
-      </p:ext>
-    </p:extLst>
-  </p:cSld>
-  <p:clrMapOvr>
-    <a:masterClrMapping/>
-  </p:clrMapOvr>
-</p:sldLayout>
-</file>
-
-<file path=ppt/slideLayouts/slideLayout9.xml><?xml version="1.0" encoding="utf-8"?>
-<p:sldLayout xmlns:a="http://schemas.openxmlformats.org/drawingml/2006/main" xmlns:r="http://schemas.openxmlformats.org/officeDocument/2006/relationships" xmlns:p="http://schemas.openxmlformats.org/presentationml/2006/main" type="titleOnly" preserve="1">
-  <p:cSld name="Title Only">
-    <p:spTree>
-      <p:nvGrpSpPr>
-        <p:cNvPr id="1" name=""/>
-        <p:cNvGrpSpPr/>
-        <p:nvPr/>
-      </p:nvGrpSpPr>
-      <p:grpSpPr>
-        <a:xfrm>
-          <a:off x="0" y="0"/>
-          <a:ext cx="0" cy="0"/>
-          <a:chOff x="0" y="0"/>
-          <a:chExt cx="0" cy="0"/>
-        </a:xfrm>
-      </p:grpSpPr>
-      <p:sp>
-        <p:nvSpPr>
-          <p:cNvPr id="2" name="Title 1">
-            <a:extLst>
-              <a:ext uri="{FF2B5EF4-FFF2-40B4-BE49-F238E27FC236}">
-                <a16:creationId xmlns:a16="http://schemas.microsoft.com/office/drawing/2014/main" id="{5A4F245B-1D17-452E-A2AA-89328C26855D}"/>
-              </a:ext>
-            </a:extLst>
-          </p:cNvPr>
-          <p:cNvSpPr>
-            <a:spLocks noGrp="1"/>
-          </p:cNvSpPr>
-          <p:nvPr>
-            <p:ph type="title"/>
-          </p:nvPr>
-        </p:nvSpPr>
-        <p:spPr/>
-        <p:txBody>
-          <a:bodyPr/>
-          <a:lstStyle/>
-          <a:p>
-            <a:r>
-              <a:rPr lang="en-US"/>
-              <a:t>Click to edit Master title style</a:t>
-            </a:r>
-          </a:p>
-        </p:txBody>
-      </p:sp>
-      <p:sp>
-        <p:nvSpPr>
-          <p:cNvPr id="3" name="Date Placeholder 2">
-            <a:extLst>
-              <a:ext uri="{FF2B5EF4-FFF2-40B4-BE49-F238E27FC236}">
-                <a16:creationId xmlns:a16="http://schemas.microsoft.com/office/drawing/2014/main" id="{55069989-CAE6-4EC9-8C6A-0C2BA50223ED}"/>
-              </a:ext>
-            </a:extLst>
-          </p:cNvPr>
-          <p:cNvSpPr>
-            <a:spLocks noGrp="1"/>
-          </p:cNvSpPr>
-          <p:nvPr>
-            <p:ph type="dt" sz="half" idx="10"/>
-          </p:nvPr>
-        </p:nvSpPr>
-        <p:spPr/>
-        <p:txBody>
-          <a:bodyPr/>
-          <a:lstStyle/>
-          <a:p>
-            <a:fld id="{33C097DD-9DB6-4F84-85E9-154C10E390F0}" type="datetimeFigureOut">
-              <a:rPr lang="en-US" smtClean="0"/>
-              <a:t>10/16/2022</a:t>
-            </a:fld>
-            <a:endParaRPr lang="en-US"/>
-          </a:p>
-        </p:txBody>
-      </p:sp>
-      <p:sp>
-        <p:nvSpPr>
-          <p:cNvPr id="4" name="Footer Placeholder 3">
-            <a:extLst>
-              <a:ext uri="{FF2B5EF4-FFF2-40B4-BE49-F238E27FC236}">
-                <a16:creationId xmlns:a16="http://schemas.microsoft.com/office/drawing/2014/main" id="{D3FADBF3-6DCF-4B88-87F6-F4028E65D706}"/>
-              </a:ext>
-            </a:extLst>
-          </p:cNvPr>
-          <p:cNvSpPr>
-            <a:spLocks noGrp="1"/>
-          </p:cNvSpPr>
-          <p:nvPr>
-            <p:ph type="ftr" sz="quarter" idx="11"/>
-          </p:nvPr>
-        </p:nvSpPr>
-        <p:spPr/>
-        <p:txBody>
-          <a:bodyPr/>
-          <a:lstStyle/>
-          <a:p>
-            <a:endParaRPr lang="en-US"/>
-          </a:p>
-        </p:txBody>
-      </p:sp>
-      <p:sp>
-        <p:nvSpPr>
-          <p:cNvPr id="5" name="Slide Number Placeholder 4">
-            <a:extLst>
-              <a:ext uri="{FF2B5EF4-FFF2-40B4-BE49-F238E27FC236}">
-                <a16:creationId xmlns:a16="http://schemas.microsoft.com/office/drawing/2014/main" id="{F6B2BFF5-BA85-4196-BF70-3F8232BEFD23}"/>
-              </a:ext>
-            </a:extLst>
-          </p:cNvPr>
-          <p:cNvSpPr>
-            <a:spLocks noGrp="1"/>
-          </p:cNvSpPr>
-          <p:nvPr>
-            <p:ph type="sldNum" sz="quarter" idx="12"/>
-          </p:nvPr>
-        </p:nvSpPr>
-        <p:spPr/>
-        <p:txBody>
-          <a:bodyPr/>
-          <a:lstStyle/>
-          <a:p>
-            <a:fld id="{6CBBE739-9242-47BC-BB2E-5DA11B8BDC80}" type="slidenum">
-              <a:rPr lang="en-US" smtClean="0"/>
-              <a:t>‹#›</a:t>
-            </a:fld>
-            <a:endParaRPr lang="en-US"/>
-          </a:p>
-        </p:txBody>
-      </p:sp>
-    </p:spTree>
-    <p:extLst>
-      <p:ext uri="{BB962C8B-B14F-4D97-AF65-F5344CB8AC3E}">
-        <p14:creationId xmlns:p14="http://schemas.microsoft.com/office/powerpoint/2010/main" val="4069448343"/>
       </p:ext>
     </p:extLst>
   </p:cSld>
@@ -4389,7 +4654,7 @@
           <a:p>
             <a:fld id="{33C097DD-9DB6-4F84-85E9-154C10E390F0}" type="datetimeFigureOut">
               <a:rPr lang="en-US" smtClean="0"/>
-              <a:t>10/16/2022</a:t>
+              <a:t>10/25/2022</a:t>
             </a:fld>
             <a:endParaRPr lang="en-US"/>
           </a:p>
@@ -4501,13 +4766,14 @@
     <p:sldLayoutId id="2147483661" r:id="rId5"/>
     <p:sldLayoutId id="2147483651" r:id="rId6"/>
     <p:sldLayoutId id="2147483652" r:id="rId7"/>
-    <p:sldLayoutId id="2147483653" r:id="rId8"/>
-    <p:sldLayoutId id="2147483654" r:id="rId9"/>
-    <p:sldLayoutId id="2147483655" r:id="rId10"/>
-    <p:sldLayoutId id="2147483656" r:id="rId11"/>
-    <p:sldLayoutId id="2147483657" r:id="rId12"/>
-    <p:sldLayoutId id="2147483658" r:id="rId13"/>
-    <p:sldLayoutId id="2147483659" r:id="rId14"/>
+    <p:sldLayoutId id="2147483663" r:id="rId8"/>
+    <p:sldLayoutId id="2147483653" r:id="rId9"/>
+    <p:sldLayoutId id="2147483654" r:id="rId10"/>
+    <p:sldLayoutId id="2147483655" r:id="rId11"/>
+    <p:sldLayoutId id="2147483656" r:id="rId12"/>
+    <p:sldLayoutId id="2147483657" r:id="rId13"/>
+    <p:sldLayoutId id="2147483658" r:id="rId14"/>
+    <p:sldLayoutId id="2147483659" r:id="rId15"/>
   </p:sldLayoutIdLst>
   <p:txStyles>
     <p:titleStyle>

</xml_diff>